<commit_message>
updated documentation and help files
</commit_message>
<xml_diff>
--- a/Project Proposals/Artifact Connection Diagram.pptx
+++ b/Project Proposals/Artifact Connection Diagram.pptx
@@ -288,7 +288,7 @@
           <a:p>
             <a:fld id="{FA80C49D-D2B1-4C16-A521-F3A2349A1B2E}" type="datetimeFigureOut">
               <a:rPr lang="en-US" smtClean="0"/>
-              <a:t>5/19/2015</a:t>
+              <a:t>5/22/2015</a:t>
             </a:fld>
             <a:endParaRPr lang="en-US"/>
           </a:p>
@@ -458,7 +458,7 @@
           <a:p>
             <a:fld id="{FA80C49D-D2B1-4C16-A521-F3A2349A1B2E}" type="datetimeFigureOut">
               <a:rPr lang="en-US" smtClean="0"/>
-              <a:t>5/19/2015</a:t>
+              <a:t>5/22/2015</a:t>
             </a:fld>
             <a:endParaRPr lang="en-US"/>
           </a:p>
@@ -638,7 +638,7 @@
           <a:p>
             <a:fld id="{FA80C49D-D2B1-4C16-A521-F3A2349A1B2E}" type="datetimeFigureOut">
               <a:rPr lang="en-US" smtClean="0"/>
-              <a:t>5/19/2015</a:t>
+              <a:t>5/22/2015</a:t>
             </a:fld>
             <a:endParaRPr lang="en-US"/>
           </a:p>
@@ -808,7 +808,7 @@
           <a:p>
             <a:fld id="{FA80C49D-D2B1-4C16-A521-F3A2349A1B2E}" type="datetimeFigureOut">
               <a:rPr lang="en-US" smtClean="0"/>
-              <a:t>5/19/2015</a:t>
+              <a:t>5/22/2015</a:t>
             </a:fld>
             <a:endParaRPr lang="en-US"/>
           </a:p>
@@ -1054,7 +1054,7 @@
           <a:p>
             <a:fld id="{FA80C49D-D2B1-4C16-A521-F3A2349A1B2E}" type="datetimeFigureOut">
               <a:rPr lang="en-US" smtClean="0"/>
-              <a:t>5/19/2015</a:t>
+              <a:t>5/22/2015</a:t>
             </a:fld>
             <a:endParaRPr lang="en-US"/>
           </a:p>
@@ -1342,7 +1342,7 @@
           <a:p>
             <a:fld id="{FA80C49D-D2B1-4C16-A521-F3A2349A1B2E}" type="datetimeFigureOut">
               <a:rPr lang="en-US" smtClean="0"/>
-              <a:t>5/19/2015</a:t>
+              <a:t>5/22/2015</a:t>
             </a:fld>
             <a:endParaRPr lang="en-US"/>
           </a:p>
@@ -1764,7 +1764,7 @@
           <a:p>
             <a:fld id="{FA80C49D-D2B1-4C16-A521-F3A2349A1B2E}" type="datetimeFigureOut">
               <a:rPr lang="en-US" smtClean="0"/>
-              <a:t>5/19/2015</a:t>
+              <a:t>5/22/2015</a:t>
             </a:fld>
             <a:endParaRPr lang="en-US"/>
           </a:p>
@@ -1882,7 +1882,7 @@
           <a:p>
             <a:fld id="{FA80C49D-D2B1-4C16-A521-F3A2349A1B2E}" type="datetimeFigureOut">
               <a:rPr lang="en-US" smtClean="0"/>
-              <a:t>5/19/2015</a:t>
+              <a:t>5/22/2015</a:t>
             </a:fld>
             <a:endParaRPr lang="en-US"/>
           </a:p>
@@ -1977,7 +1977,7 @@
           <a:p>
             <a:fld id="{FA80C49D-D2B1-4C16-A521-F3A2349A1B2E}" type="datetimeFigureOut">
               <a:rPr lang="en-US" smtClean="0"/>
-              <a:t>5/19/2015</a:t>
+              <a:t>5/22/2015</a:t>
             </a:fld>
             <a:endParaRPr lang="en-US"/>
           </a:p>
@@ -2254,7 +2254,7 @@
           <a:p>
             <a:fld id="{FA80C49D-D2B1-4C16-A521-F3A2349A1B2E}" type="datetimeFigureOut">
               <a:rPr lang="en-US" smtClean="0"/>
-              <a:t>5/19/2015</a:t>
+              <a:t>5/22/2015</a:t>
             </a:fld>
             <a:endParaRPr lang="en-US"/>
           </a:p>
@@ -2507,7 +2507,7 @@
           <a:p>
             <a:fld id="{FA80C49D-D2B1-4C16-A521-F3A2349A1B2E}" type="datetimeFigureOut">
               <a:rPr lang="en-US" smtClean="0"/>
-              <a:t>5/19/2015</a:t>
+              <a:t>5/22/2015</a:t>
             </a:fld>
             <a:endParaRPr lang="en-US"/>
           </a:p>
@@ -2720,7 +2720,7 @@
           <a:p>
             <a:fld id="{FA80C49D-D2B1-4C16-A521-F3A2349A1B2E}" type="datetimeFigureOut">
               <a:rPr lang="en-US" smtClean="0"/>
-              <a:t>5/19/2015</a:t>
+              <a:t>5/22/2015</a:t>
             </a:fld>
             <a:endParaRPr lang="en-US"/>
           </a:p>
@@ -4006,17 +4006,7 @@
                 <a:latin typeface="Arial" panose="020B0604020202020204" pitchFamily="34" charset="0"/>
                 <a:cs typeface="Arial" panose="020B0604020202020204" pitchFamily="34" charset="0"/>
               </a:rPr>
-              <a:t>Power Cord </a:t>
-            </a:r>
-            <a:r>
-              <a:rPr lang="en-US" sz="1400" dirty="0" smtClean="0">
-                <a:solidFill>
-                  <a:schemeClr val="tx1"/>
-                </a:solidFill>
-                <a:latin typeface="Arial" panose="020B0604020202020204" pitchFamily="34" charset="0"/>
-                <a:cs typeface="Arial" panose="020B0604020202020204" pitchFamily="34" charset="0"/>
-              </a:rPr>
-              <a:t>(NEMA 5-15R)</a:t>
+              <a:t>Power Cord (NEMA 5-15R)</a:t>
             </a:r>
           </a:p>
         </p:txBody>
@@ -4479,17 +4469,7 @@
                 <a:latin typeface="Arial" panose="020B0604020202020204" pitchFamily="34" charset="0"/>
                 <a:cs typeface="Arial" panose="020B0604020202020204" pitchFamily="34" charset="0"/>
               </a:rPr>
-              <a:t>Power Cord </a:t>
-            </a:r>
-            <a:r>
-              <a:rPr lang="en-US" sz="1400" dirty="0" smtClean="0">
-                <a:solidFill>
-                  <a:schemeClr val="tx1"/>
-                </a:solidFill>
-                <a:latin typeface="Arial" panose="020B0604020202020204" pitchFamily="34" charset="0"/>
-                <a:cs typeface="Arial" panose="020B0604020202020204" pitchFamily="34" charset="0"/>
-              </a:rPr>
-              <a:t>(NEMA 5-15R)</a:t>
+              <a:t>Power Cord (NEMA 5-15R)</a:t>
             </a:r>
           </a:p>
         </p:txBody>
@@ -4543,17 +4523,7 @@
                 <a:latin typeface="Arial" panose="020B0604020202020204" pitchFamily="34" charset="0"/>
                 <a:cs typeface="Arial" panose="020B0604020202020204" pitchFamily="34" charset="0"/>
               </a:rPr>
-              <a:t>Power Cord </a:t>
-            </a:r>
-            <a:r>
-              <a:rPr lang="en-US" sz="1400" dirty="0" smtClean="0">
-                <a:solidFill>
-                  <a:schemeClr val="tx1"/>
-                </a:solidFill>
-                <a:latin typeface="Arial" panose="020B0604020202020204" pitchFamily="34" charset="0"/>
-                <a:cs typeface="Arial" panose="020B0604020202020204" pitchFamily="34" charset="0"/>
-              </a:rPr>
-              <a:t>(NEMA 5-15R)</a:t>
+              <a:t>Power Cord (NEMA 5-15R)</a:t>
             </a:r>
           </a:p>
         </p:txBody>
@@ -4731,13 +4701,102 @@
               </a:rPr>
               <a:t>HDMI</a:t>
             </a:r>
-            <a:endParaRPr lang="en-US" sz="1400" dirty="0" smtClean="0">
-              <a:solidFill>
-                <a:schemeClr val="tx1"/>
-              </a:solidFill>
-              <a:latin typeface="Arial" panose="020B0604020202020204" pitchFamily="34" charset="0"/>
-              <a:cs typeface="Arial" panose="020B0604020202020204" pitchFamily="34" charset="0"/>
-            </a:endParaRPr>
+          </a:p>
+        </p:txBody>
+      </p:sp>
+      <p:cxnSp>
+        <p:nvCxnSpPr>
+          <p:cNvPr id="33" name="Elbow Connector 32"/>
+          <p:cNvCxnSpPr>
+            <a:stCxn id="78" idx="0"/>
+          </p:cNvCxnSpPr>
+          <p:nvPr/>
+        </p:nvCxnSpPr>
+        <p:spPr>
+          <a:xfrm rot="16200000" flipH="1" flipV="1">
+            <a:off x="2226603" y="-1559853"/>
+            <a:ext cx="2027434" cy="5871039"/>
+          </a:xfrm>
+          <a:prstGeom prst="bentConnector4">
+            <a:avLst>
+              <a:gd name="adj1" fmla="val -11275"/>
+              <a:gd name="adj2" fmla="val 100084"/>
+            </a:avLst>
+          </a:prstGeom>
+          <a:ln w="38100">
+            <a:solidFill>
+              <a:srgbClr val="FF0000"/>
+            </a:solidFill>
+            <a:headEnd type="none" w="med" len="med"/>
+            <a:tailEnd type="none" w="med" len="med"/>
+          </a:ln>
+        </p:spPr>
+        <p:style>
+          <a:lnRef idx="1">
+            <a:schemeClr val="accent1"/>
+          </a:lnRef>
+          <a:fillRef idx="0">
+            <a:schemeClr val="accent1"/>
+          </a:fillRef>
+          <a:effectRef idx="0">
+            <a:schemeClr val="accent1"/>
+          </a:effectRef>
+          <a:fontRef idx="minor">
+            <a:schemeClr val="tx1"/>
+          </a:fontRef>
+        </p:style>
+      </p:cxnSp>
+      <p:sp>
+        <p:nvSpPr>
+          <p:cNvPr id="38" name="Rectangle 37"/>
+          <p:cNvSpPr/>
+          <p:nvPr/>
+        </p:nvSpPr>
+        <p:spPr>
+          <a:xfrm>
+            <a:off x="152400" y="133350"/>
+            <a:ext cx="2498332" cy="295917"/>
+          </a:xfrm>
+          <a:prstGeom prst="rect">
+            <a:avLst/>
+          </a:prstGeom>
+          <a:noFill/>
+          <a:ln w="38100">
+            <a:noFill/>
+            <a:prstDash val="sysDash"/>
+          </a:ln>
+        </p:spPr>
+        <p:style>
+          <a:lnRef idx="2">
+            <a:schemeClr val="accent1">
+              <a:shade val="50000"/>
+            </a:schemeClr>
+          </a:lnRef>
+          <a:fillRef idx="1">
+            <a:schemeClr val="accent1"/>
+          </a:fillRef>
+          <a:effectRef idx="0">
+            <a:schemeClr val="accent1"/>
+          </a:effectRef>
+          <a:fontRef idx="minor">
+            <a:schemeClr val="lt1"/>
+          </a:fontRef>
+        </p:style>
+        <p:txBody>
+          <a:bodyPr rtlCol="0" anchor="ctr"/>
+          <a:lstStyle/>
+          <a:p>
+            <a:pPr algn="ctr"/>
+            <a:r>
+              <a:rPr lang="en-US" sz="1400" dirty="0" smtClean="0">
+                <a:solidFill>
+                  <a:schemeClr val="tx1"/>
+                </a:solidFill>
+                <a:latin typeface="Arial" panose="020B0604020202020204" pitchFamily="34" charset="0"/>
+                <a:cs typeface="Arial" panose="020B0604020202020204" pitchFamily="34" charset="0"/>
+              </a:rPr>
+              <a:t>Power Cord (NEMA 5-15R)</a:t>
+            </a:r>
           </a:p>
         </p:txBody>
       </p:sp>

</xml_diff>